<commit_message>
everything is working properly
</commit_message>
<xml_diff>
--- a/imgs/Presentation1.pptx
+++ b/imgs/Presentation1.pptx
@@ -7,11 +7,11 @@
   <p:sldIdLst>
     <p:sldId id="256" r:id="rId2"/>
     <p:sldId id="257" r:id="rId3"/>
-    <p:sldId id="271" r:id="rId4"/>
-    <p:sldId id="274" r:id="rId5"/>
-    <p:sldId id="272" r:id="rId6"/>
-    <p:sldId id="273" r:id="rId7"/>
-    <p:sldId id="269" r:id="rId8"/>
+    <p:sldId id="273" r:id="rId4"/>
+    <p:sldId id="278" r:id="rId5"/>
+    <p:sldId id="277" r:id="rId6"/>
+    <p:sldId id="276" r:id="rId7"/>
+    <p:sldId id="275" r:id="rId8"/>
     <p:sldId id="270" r:id="rId9"/>
     <p:sldId id="258" r:id="rId10"/>
     <p:sldId id="259" r:id="rId11"/>
@@ -274,7 +274,7 @@
           <a:p>
             <a:fld id="{44CF53D2-50EC-E34A-B06C-DF4557C299C4}" type="datetimeFigureOut">
               <a:rPr lang="en-US" smtClean="0"/>
-              <a:t>2/27/24</a:t>
+              <a:t>2/28/24</a:t>
             </a:fld>
             <a:endParaRPr lang="en-US"/>
           </a:p>
@@ -472,7 +472,7 @@
           <a:p>
             <a:fld id="{44CF53D2-50EC-E34A-B06C-DF4557C299C4}" type="datetimeFigureOut">
               <a:rPr lang="en-US" smtClean="0"/>
-              <a:t>2/27/24</a:t>
+              <a:t>2/28/24</a:t>
             </a:fld>
             <a:endParaRPr lang="en-US"/>
           </a:p>
@@ -680,7 +680,7 @@
           <a:p>
             <a:fld id="{44CF53D2-50EC-E34A-B06C-DF4557C299C4}" type="datetimeFigureOut">
               <a:rPr lang="en-US" smtClean="0"/>
-              <a:t>2/27/24</a:t>
+              <a:t>2/28/24</a:t>
             </a:fld>
             <a:endParaRPr lang="en-US"/>
           </a:p>
@@ -878,7 +878,7 @@
           <a:p>
             <a:fld id="{44CF53D2-50EC-E34A-B06C-DF4557C299C4}" type="datetimeFigureOut">
               <a:rPr lang="en-US" smtClean="0"/>
-              <a:t>2/27/24</a:t>
+              <a:t>2/28/24</a:t>
             </a:fld>
             <a:endParaRPr lang="en-US"/>
           </a:p>
@@ -1153,7 +1153,7 @@
           <a:p>
             <a:fld id="{44CF53D2-50EC-E34A-B06C-DF4557C299C4}" type="datetimeFigureOut">
               <a:rPr lang="en-US" smtClean="0"/>
-              <a:t>2/27/24</a:t>
+              <a:t>2/28/24</a:t>
             </a:fld>
             <a:endParaRPr lang="en-US"/>
           </a:p>
@@ -1418,7 +1418,7 @@
           <a:p>
             <a:fld id="{44CF53D2-50EC-E34A-B06C-DF4557C299C4}" type="datetimeFigureOut">
               <a:rPr lang="en-US" smtClean="0"/>
-              <a:t>2/27/24</a:t>
+              <a:t>2/28/24</a:t>
             </a:fld>
             <a:endParaRPr lang="en-US"/>
           </a:p>
@@ -1830,7 +1830,7 @@
           <a:p>
             <a:fld id="{44CF53D2-50EC-E34A-B06C-DF4557C299C4}" type="datetimeFigureOut">
               <a:rPr lang="en-US" smtClean="0"/>
-              <a:t>2/27/24</a:t>
+              <a:t>2/28/24</a:t>
             </a:fld>
             <a:endParaRPr lang="en-US"/>
           </a:p>
@@ -1971,7 +1971,7 @@
           <a:p>
             <a:fld id="{44CF53D2-50EC-E34A-B06C-DF4557C299C4}" type="datetimeFigureOut">
               <a:rPr lang="en-US" smtClean="0"/>
-              <a:t>2/27/24</a:t>
+              <a:t>2/28/24</a:t>
             </a:fld>
             <a:endParaRPr lang="en-US"/>
           </a:p>
@@ -2084,7 +2084,7 @@
           <a:p>
             <a:fld id="{44CF53D2-50EC-E34A-B06C-DF4557C299C4}" type="datetimeFigureOut">
               <a:rPr lang="en-US" smtClean="0"/>
-              <a:t>2/27/24</a:t>
+              <a:t>2/28/24</a:t>
             </a:fld>
             <a:endParaRPr lang="en-US"/>
           </a:p>
@@ -2395,7 +2395,7 @@
           <a:p>
             <a:fld id="{44CF53D2-50EC-E34A-B06C-DF4557C299C4}" type="datetimeFigureOut">
               <a:rPr lang="en-US" smtClean="0"/>
-              <a:t>2/27/24</a:t>
+              <a:t>2/28/24</a:t>
             </a:fld>
             <a:endParaRPr lang="en-US"/>
           </a:p>
@@ -2683,7 +2683,7 @@
           <a:p>
             <a:fld id="{44CF53D2-50EC-E34A-B06C-DF4557C299C4}" type="datetimeFigureOut">
               <a:rPr lang="en-US" smtClean="0"/>
-              <a:t>2/27/24</a:t>
+              <a:t>2/28/24</a:t>
             </a:fld>
             <a:endParaRPr lang="en-US"/>
           </a:p>
@@ -2924,7 +2924,7 @@
           <a:p>
             <a:fld id="{44CF53D2-50EC-E34A-B06C-DF4557C299C4}" type="datetimeFigureOut">
               <a:rPr lang="en-US" smtClean="0"/>
-              <a:t>2/27/24</a:t>
+              <a:t>2/28/24</a:t>
             </a:fld>
             <a:endParaRPr lang="en-US"/>
           </a:p>
@@ -4755,7 +4755,7 @@
           </p:cNvPicPr>
           <p:nvPr/>
         </p:nvPicPr>
-        <p:blipFill>
+        <p:blipFill rotWithShape="1">
           <a:blip r:embed="rId2">
             <a:extLst>
               <a:ext uri="{BEBA8EAE-BF5A-486C-A8C5-ECC9F3942E4B}">
@@ -4824,15 +4824,13 @@
               </a:ext>
             </a:extLst>
           </a:blip>
-          <a:srcRect/>
-          <a:stretch>
-            <a:fillRect/>
-          </a:stretch>
+          <a:srcRect l="29565" t="20520" r="29541" b="17334"/>
+          <a:stretch/>
         </p:blipFill>
         <p:spPr bwMode="auto">
           <a:xfrm>
-            <a:off x="2006600" y="-81280"/>
-            <a:ext cx="6858000" cy="6858000"/>
+            <a:off x="4034197" y="1325983"/>
+            <a:ext cx="2804479" cy="4261972"/>
           </a:xfrm>
           <a:prstGeom prst="rect">
             <a:avLst/>
@@ -4852,7 +4850,7 @@
     </p:spTree>
     <p:extLst>
       <p:ext uri="{BB962C8B-B14F-4D97-AF65-F5344CB8AC3E}">
-        <p14:creationId xmlns:p14="http://schemas.microsoft.com/office/powerpoint/2010/main" val="4018254557"/>
+        <p14:creationId xmlns:p14="http://schemas.microsoft.com/office/powerpoint/2010/main" val="94959891"/>
       </p:ext>
     </p:extLst>
   </p:cSld>
@@ -4893,7 +4891,7 @@
           </p:cNvPicPr>
           <p:nvPr/>
         </p:nvPicPr>
-        <p:blipFill>
+        <p:blipFill rotWithShape="1">
           <a:blip r:embed="rId2">
             <a:extLst>
               <a:ext uri="{BEBA8EAE-BF5A-486C-A8C5-ECC9F3942E4B}">
@@ -4962,15 +4960,13 @@
               </a:ext>
             </a:extLst>
           </a:blip>
-          <a:srcRect/>
-          <a:stretch>
-            <a:fillRect/>
-          </a:stretch>
+          <a:srcRect l="29565" t="20520" r="29541" b="17334"/>
+          <a:stretch/>
         </p:blipFill>
         <p:spPr bwMode="auto">
           <a:xfrm>
-            <a:off x="2006600" y="-81280"/>
-            <a:ext cx="6858000" cy="6858000"/>
+            <a:off x="4034197" y="1325983"/>
+            <a:ext cx="2804479" cy="4261972"/>
           </a:xfrm>
           <a:prstGeom prst="rect">
             <a:avLst/>
@@ -5002,7 +4998,7 @@
         <p:spPr>
           <a:xfrm>
             <a:off x="4399280" y="3942080"/>
-            <a:ext cx="1940560" cy="1930400"/>
+            <a:ext cx="1940560" cy="1645875"/>
           </a:xfrm>
           <a:prstGeom prst="rect">
             <a:avLst/>
@@ -5033,21 +5029,14 @@
           <a:lstStyle/>
           <a:p>
             <a:pPr algn="ctr"/>
-            <a:endParaRPr lang="en-US" dirty="0">
-              <a:solidFill>
-                <a:srgbClr val="FF0000"/>
-              </a:solidFill>
-              <a:highlight>
-                <a:srgbClr val="FFFF00"/>
-              </a:highlight>
-            </a:endParaRPr>
+            <a:endParaRPr lang="en-US"/>
           </a:p>
         </p:txBody>
       </p:sp>
     </p:spTree>
     <p:extLst>
       <p:ext uri="{BB962C8B-B14F-4D97-AF65-F5344CB8AC3E}">
-        <p14:creationId xmlns:p14="http://schemas.microsoft.com/office/powerpoint/2010/main" val="2186821014"/>
+        <p14:creationId xmlns:p14="http://schemas.microsoft.com/office/powerpoint/2010/main" val="4068440150"/>
       </p:ext>
     </p:extLst>
   </p:cSld>
@@ -5088,7 +5077,7 @@
           </p:cNvPicPr>
           <p:nvPr/>
         </p:nvPicPr>
-        <p:blipFill>
+        <p:blipFill rotWithShape="1">
           <a:blip r:embed="rId2">
             <a:extLst>
               <a:ext uri="{BEBA8EAE-BF5A-486C-A8C5-ECC9F3942E4B}">
@@ -5157,15 +5146,13 @@
               </a:ext>
             </a:extLst>
           </a:blip>
-          <a:srcRect/>
-          <a:stretch>
-            <a:fillRect/>
-          </a:stretch>
+          <a:srcRect l="29565" t="20520" r="29541" b="17334"/>
+          <a:stretch/>
         </p:blipFill>
         <p:spPr bwMode="auto">
           <a:xfrm>
-            <a:off x="2006600" y="0"/>
-            <a:ext cx="6858000" cy="6858000"/>
+            <a:off x="4034197" y="1325983"/>
+            <a:ext cx="2804479" cy="4261972"/>
           </a:xfrm>
           <a:prstGeom prst="rect">
             <a:avLst/>
@@ -5197,7 +5184,7 @@
         <p:spPr>
           <a:xfrm>
             <a:off x="4399280" y="3942080"/>
-            <a:ext cx="1940560" cy="1930400"/>
+            <a:ext cx="1940560" cy="1645875"/>
           </a:xfrm>
           <a:prstGeom prst="rect">
             <a:avLst/>
@@ -5246,8 +5233,8 @@
         </p:nvSpPr>
         <p:spPr>
           <a:xfrm>
-            <a:off x="2743200" y="2382520"/>
-            <a:ext cx="1940560" cy="1930400"/>
+            <a:off x="4034196" y="2382520"/>
+            <a:ext cx="649563" cy="1930400"/>
           </a:xfrm>
           <a:prstGeom prst="rect">
             <a:avLst/>
@@ -5285,7 +5272,7 @@
     </p:spTree>
     <p:extLst>
       <p:ext uri="{BB962C8B-B14F-4D97-AF65-F5344CB8AC3E}">
-        <p14:creationId xmlns:p14="http://schemas.microsoft.com/office/powerpoint/2010/main" val="3629803456"/>
+        <p14:creationId xmlns:p14="http://schemas.microsoft.com/office/powerpoint/2010/main" val="647874380"/>
       </p:ext>
     </p:extLst>
   </p:cSld>
@@ -5326,7 +5313,7 @@
           </p:cNvPicPr>
           <p:nvPr/>
         </p:nvPicPr>
-        <p:blipFill>
+        <p:blipFill rotWithShape="1">
           <a:blip r:embed="rId2">
             <a:extLst>
               <a:ext uri="{BEBA8EAE-BF5A-486C-A8C5-ECC9F3942E4B}">
@@ -5395,15 +5382,13 @@
               </a:ext>
             </a:extLst>
           </a:blip>
-          <a:srcRect/>
-          <a:stretch>
-            <a:fillRect/>
-          </a:stretch>
+          <a:srcRect l="29565" t="20520" r="29541" b="17334"/>
+          <a:stretch/>
         </p:blipFill>
         <p:spPr bwMode="auto">
           <a:xfrm>
-            <a:off x="2006600" y="-81280"/>
-            <a:ext cx="6858000" cy="6858000"/>
+            <a:off x="4034197" y="1325983"/>
+            <a:ext cx="2804479" cy="4261972"/>
           </a:xfrm>
           <a:prstGeom prst="rect">
             <a:avLst/>
@@ -5435,7 +5420,7 @@
         <p:spPr>
           <a:xfrm>
             <a:off x="4399280" y="3942080"/>
-            <a:ext cx="1940560" cy="1930400"/>
+            <a:ext cx="1940560" cy="1645875"/>
           </a:xfrm>
           <a:prstGeom prst="rect">
             <a:avLst/>
@@ -5484,8 +5469,8 @@
         </p:nvSpPr>
         <p:spPr>
           <a:xfrm>
-            <a:off x="3992880" y="2382520"/>
-            <a:ext cx="690880" cy="1930400"/>
+            <a:off x="4034196" y="2382520"/>
+            <a:ext cx="649563" cy="1930400"/>
           </a:xfrm>
           <a:prstGeom prst="rect">
             <a:avLst/>
@@ -5535,7 +5520,7 @@
         <p:spPr>
           <a:xfrm>
             <a:off x="6248400" y="2453640"/>
-            <a:ext cx="690880" cy="1559560"/>
+            <a:ext cx="590276" cy="1591586"/>
           </a:xfrm>
           <a:prstGeom prst="rect">
             <a:avLst/>
@@ -5573,7 +5558,7 @@
     </p:spTree>
     <p:extLst>
       <p:ext uri="{BB962C8B-B14F-4D97-AF65-F5344CB8AC3E}">
-        <p14:creationId xmlns:p14="http://schemas.microsoft.com/office/powerpoint/2010/main" val="94959891"/>
+        <p14:creationId xmlns:p14="http://schemas.microsoft.com/office/powerpoint/2010/main" val="3371558337"/>
       </p:ext>
     </p:extLst>
   </p:cSld>
@@ -5614,7 +5599,7 @@
           </p:cNvPicPr>
           <p:nvPr/>
         </p:nvPicPr>
-        <p:blipFill>
+        <p:blipFill rotWithShape="1">
           <a:blip r:embed="rId2">
             <a:extLst>
               <a:ext uri="{BEBA8EAE-BF5A-486C-A8C5-ECC9F3942E4B}">
@@ -5683,15 +5668,13 @@
               </a:ext>
             </a:extLst>
           </a:blip>
-          <a:srcRect/>
-          <a:stretch>
-            <a:fillRect/>
-          </a:stretch>
+          <a:srcRect l="29565" t="20520" r="29541" b="17334"/>
+          <a:stretch/>
         </p:blipFill>
         <p:spPr bwMode="auto">
           <a:xfrm>
-            <a:off x="2006600" y="-81280"/>
-            <a:ext cx="6858000" cy="6858000"/>
+            <a:off x="4034197" y="1325983"/>
+            <a:ext cx="2804479" cy="4261972"/>
           </a:xfrm>
           <a:prstGeom prst="rect">
             <a:avLst/>
@@ -5723,7 +5706,7 @@
         <p:spPr>
           <a:xfrm>
             <a:off x="4399280" y="3942080"/>
-            <a:ext cx="1940560" cy="1930400"/>
+            <a:ext cx="1940560" cy="1645875"/>
           </a:xfrm>
           <a:prstGeom prst="rect">
             <a:avLst/>
@@ -5772,8 +5755,8 @@
         </p:nvSpPr>
         <p:spPr>
           <a:xfrm>
-            <a:off x="3992880" y="2382520"/>
-            <a:ext cx="690880" cy="1930400"/>
+            <a:off x="4034196" y="2382520"/>
+            <a:ext cx="649563" cy="1930400"/>
           </a:xfrm>
           <a:prstGeom prst="rect">
             <a:avLst/>
@@ -5822,8 +5805,8 @@
         </p:nvSpPr>
         <p:spPr>
           <a:xfrm>
-            <a:off x="6248400" y="2453640"/>
-            <a:ext cx="690880" cy="1559560"/>
+            <a:off x="6248400" y="2382520"/>
+            <a:ext cx="590276" cy="1662706"/>
           </a:xfrm>
           <a:prstGeom prst="rect">
             <a:avLst/>
@@ -5863,7 +5846,7 @@
           <p:cNvPr id="5" name="Rectangle 4">
             <a:extLst>
               <a:ext uri="{FF2B5EF4-FFF2-40B4-BE49-F238E27FC236}">
-                <a16:creationId xmlns:a16="http://schemas.microsoft.com/office/drawing/2014/main" id="{26C89C28-5022-575C-44DD-2C19C4E76EF4}"/>
+                <a16:creationId xmlns:a16="http://schemas.microsoft.com/office/drawing/2014/main" id="{0A56122C-24EC-9A92-C590-691E650D81ED}"/>
               </a:ext>
             </a:extLst>
           </p:cNvPr>
@@ -5873,7 +5856,7 @@
         <p:spPr>
           <a:xfrm>
             <a:off x="4475480" y="2382520"/>
-            <a:ext cx="2270760" cy="1930400"/>
+            <a:ext cx="1864360" cy="1930400"/>
           </a:xfrm>
           <a:prstGeom prst="rect">
             <a:avLst/>
@@ -5911,7 +5894,7 @@
     </p:spTree>
     <p:extLst>
       <p:ext uri="{BB962C8B-B14F-4D97-AF65-F5344CB8AC3E}">
-        <p14:creationId xmlns:p14="http://schemas.microsoft.com/office/powerpoint/2010/main" val="2089200009"/>
+        <p14:creationId xmlns:p14="http://schemas.microsoft.com/office/powerpoint/2010/main" val="2954035753"/>
       </p:ext>
     </p:extLst>
   </p:cSld>

</xml_diff>